<commit_message>
:movie_camera: new DYK series videos
</commit_message>
<xml_diff>
--- a/Training/DidYouKnow/DYKBanner.pptx
+++ b/Training/DidYouKnow/DYKBanner.pptx
@@ -203,6 +203,43 @@
 </p:presentation>
 </file>
 
+<file path=ppt/revisionInfo.xml><?xml version="1.0" encoding="utf-8"?>
+<p1510:revInfo xmlns:a="http://schemas.openxmlformats.org/drawingml/2006/main" xmlns:r="http://schemas.openxmlformats.org/officeDocument/2006/relationships" xmlns:p1510="http://schemas.microsoft.com/office/powerpoint/2015/10/main">
+  <p1510:revLst>
+    <p1510:client id="{8A5D56DB-8F01-4111-8444-CF026C533998}" v="1" dt="2018-10-18T07:18:39.061"/>
+  </p1510:revLst>
+</p1510:revInfo>
+</file>
+
+<file path=ppt/changesInfos/changesInfo1.xml><?xml version="1.0" encoding="utf-8"?>
+<pc:chgInfo xmlns:a="http://schemas.openxmlformats.org/drawingml/2006/main" xmlns:r="http://schemas.openxmlformats.org/officeDocument/2006/relationships" xmlns:ac="http://schemas.microsoft.com/office/drawing/2013/main/command" xmlns:pc="http://schemas.microsoft.com/office/powerpoint/2013/main/command">
+  <pc:docChgLst>
+    <pc:chgData name="David Stevens" userId="73fe415a-d21a-4898-bfab-0e75d37181d7" providerId="ADAL" clId="{8A5D56DB-8F01-4111-8444-CF026C533998}"/>
+    <pc:docChg chg="modSld">
+      <pc:chgData name="David Stevens" userId="73fe415a-d21a-4898-bfab-0e75d37181d7" providerId="ADAL" clId="{8A5D56DB-8F01-4111-8444-CF026C533998}" dt="2018-10-18T07:29:18.539" v="107" actId="20577"/>
+      <pc:docMkLst>
+        <pc:docMk/>
+      </pc:docMkLst>
+      <pc:sldChg chg="modSp">
+        <pc:chgData name="David Stevens" userId="73fe415a-d21a-4898-bfab-0e75d37181d7" providerId="ADAL" clId="{8A5D56DB-8F01-4111-8444-CF026C533998}" dt="2018-10-18T07:29:18.539" v="107" actId="20577"/>
+        <pc:sldMkLst>
+          <pc:docMk/>
+          <pc:sldMk cId="340440126" sldId="257"/>
+        </pc:sldMkLst>
+        <pc:spChg chg="mod">
+          <ac:chgData name="David Stevens" userId="73fe415a-d21a-4898-bfab-0e75d37181d7" providerId="ADAL" clId="{8A5D56DB-8F01-4111-8444-CF026C533998}" dt="2018-10-18T07:29:18.539" v="107" actId="20577"/>
+          <ac:spMkLst>
+            <pc:docMk/>
+            <pc:sldMk cId="340440126" sldId="257"/>
+            <ac:spMk id="16" creationId="{F949EEEA-FDF2-4FFE-9129-B5FBDF3B6118}"/>
+          </ac:spMkLst>
+        </pc:spChg>
+      </pc:sldChg>
+    </pc:docChg>
+  </pc:docChgLst>
+</pc:chgInfo>
+</file>
+
 <file path=ppt/handoutMasters/handoutMaster1.xml><?xml version="1.0" encoding="utf-8"?>
 <p:handoutMaster xmlns:a="http://schemas.openxmlformats.org/drawingml/2006/main" xmlns:r="http://schemas.openxmlformats.org/officeDocument/2006/relationships" xmlns:p="http://schemas.openxmlformats.org/presentationml/2006/main">
   <p:cSld>
@@ -291,7 +328,7 @@
                 <a:latin typeface="Arial"/>
                 <a:cs typeface="Arial"/>
               </a:rPr>
-              <a:t>5/14/2018</a:t>
+              <a:t>10/18/2018</a:t>
             </a:fld>
             <a:endParaRPr lang="en-US">
               <a:latin typeface="Arial"/>
@@ -476,7 +513,7 @@
             <a:fld id="{73B26A0F-F4D6-9B4F-A87B-D8948CDE3BB4}" type="datetimeFigureOut">
               <a:rPr lang="en-US" smtClean="0"/>
               <a:pPr/>
-              <a:t>5/14/2018</a:t>
+              <a:t>10/18/2018</a:t>
             </a:fld>
             <a:endParaRPr lang="en-US"/>
           </a:p>
@@ -4024,7 +4061,7 @@
                   <a:spcPct val="50000"/>
                 </a:spcBef>
               </a:pPr>
-              <a:t>May 14, 2018</a:t>
+              <a:t>October 18, 2018</a:t>
             </a:fld>
             <a:endParaRPr lang="en-US" sz="1100" b="0" dirty="0">
               <a:solidFill>
@@ -5777,7 +5814,7 @@
                   <a:spcPct val="50000"/>
                 </a:spcBef>
               </a:pPr>
-              <a:t>May 14, 2018</a:t>
+              <a:t>October 18, 2018</a:t>
             </a:fld>
             <a:endParaRPr lang="en-US" sz="1100" b="0" dirty="0">
               <a:solidFill>
@@ -7248,7 +7285,7 @@
                   <a:spcPct val="50000"/>
                 </a:spcBef>
               </a:pPr>
-              <a:t>May 14, 2018</a:t>
+              <a:t>October 18, 2018</a:t>
             </a:fld>
             <a:endParaRPr lang="en-US" sz="1100" b="0" dirty="0">
               <a:solidFill>
@@ -8601,7 +8638,7 @@
                   <a:spcPts val="0"/>
                 </a:spcBef>
               </a:pPr>
-              <a:t>May 14, 2018</a:t>
+              <a:t>October 18, 2018</a:t>
             </a:fld>
             <a:endParaRPr lang="en-US" sz="1100" b="0" dirty="0">
               <a:solidFill>
@@ -10038,7 +10075,7 @@
                   <a:spcPct val="50000"/>
                 </a:spcBef>
               </a:pPr>
-              <a:t>May 14, 2018</a:t>
+              <a:t>October 18, 2018</a:t>
             </a:fld>
             <a:endParaRPr lang="en-US" sz="1100" b="0" dirty="0">
               <a:solidFill>
@@ -13294,7 +13331,7 @@
                   <a:spcPts val="0"/>
                 </a:spcBef>
               </a:pPr>
-              <a:t>May 14, 2018</a:t>
+              <a:t>October 18, 2018</a:t>
             </a:fld>
             <a:endParaRPr lang="en-US" sz="1400" b="0" dirty="0">
               <a:solidFill>
@@ -14685,7 +14722,7 @@
                   <a:spcPts val="0"/>
                 </a:spcBef>
               </a:pPr>
-              <a:t>May 14, 2018</a:t>
+              <a:t>October 18, 2018</a:t>
             </a:fld>
             <a:endParaRPr lang="en-US" sz="1400" b="0" dirty="0">
               <a:solidFill>
@@ -16246,7 +16283,7 @@
                   <a:spcPts val="0"/>
                 </a:spcBef>
               </a:pPr>
-              <a:t>May 14, 2018</a:t>
+              <a:t>October 18, 2018</a:t>
             </a:fld>
             <a:endParaRPr lang="en-US" sz="1400" b="0" dirty="0">
               <a:solidFill>
@@ -17668,7 +17705,7 @@
                   <a:spcPts val="0"/>
                 </a:spcBef>
               </a:pPr>
-              <a:t>May 14, 2018</a:t>
+              <a:t>October 18, 2018</a:t>
             </a:fld>
             <a:endParaRPr lang="en-US" sz="1400" b="0" dirty="0">
               <a:solidFill>
@@ -19082,7 +19119,7 @@
                   <a:spcPts val="0"/>
                 </a:spcBef>
               </a:pPr>
-              <a:t>May 14, 2018</a:t>
+              <a:t>October 18, 2018</a:t>
             </a:fld>
             <a:endParaRPr lang="en-US" sz="1400" b="0" dirty="0">
               <a:solidFill>
@@ -21043,9 +21080,12 @@
           <a:p>
             <a:r>
               <a:rPr lang="en-US" dirty="0"/>
-              <a:t>#4 Learn more…</a:t>
+              <a:t>#9 </a:t>
             </a:r>
-            <a:endParaRPr lang="en-GB" dirty="0"/>
+            <a:r>
+              <a:rPr lang="en-GB" dirty="0"/>
+              <a:t>Roadmap Insights</a:t>
+            </a:r>
           </a:p>
         </p:txBody>
       </p:sp>

</xml_diff>

<commit_message>
:movie_camera: Did You Know videos
</commit_message>
<xml_diff>
--- a/Training/DidYouKnow/DYKBanner.pptx
+++ b/Training/DidYouKnow/DYKBanner.pptx
@@ -203,16 +203,32 @@
 </p:presentation>
 </file>
 
-<file path=ppt/revisionInfo.xml><?xml version="1.0" encoding="utf-8"?>
-<p1510:revInfo xmlns:a="http://schemas.openxmlformats.org/drawingml/2006/main" xmlns:r="http://schemas.openxmlformats.org/officeDocument/2006/relationships" xmlns:p1510="http://schemas.microsoft.com/office/powerpoint/2015/10/main">
-  <p1510:revLst>
-    <p1510:client id="{8A5D56DB-8F01-4111-8444-CF026C533998}" v="1" dt="2018-10-18T07:18:39.061"/>
-  </p1510:revLst>
-</p1510:revInfo>
-</file>
-
 <file path=ppt/changesInfos/changesInfo1.xml><?xml version="1.0" encoding="utf-8"?>
 <pc:chgInfo xmlns:a="http://schemas.openxmlformats.org/drawingml/2006/main" xmlns:r="http://schemas.openxmlformats.org/officeDocument/2006/relationships" xmlns:ac="http://schemas.microsoft.com/office/drawing/2013/main/command" xmlns:pc="http://schemas.microsoft.com/office/powerpoint/2013/main/command">
+  <pc:docChgLst>
+    <pc:chgData name="Stevens, David" userId="73fe415a-d21a-4898-bfab-0e75d37181d7" providerId="ADAL" clId="{403B20FF-6D52-4F6C-865B-305E558DE084}"/>
+    <pc:docChg chg="modSld">
+      <pc:chgData name="Stevens, David" userId="73fe415a-d21a-4898-bfab-0e75d37181d7" providerId="ADAL" clId="{403B20FF-6D52-4F6C-865B-305E558DE084}" dt="2018-11-22T11:52:46.018" v="187" actId="20577"/>
+      <pc:docMkLst>
+        <pc:docMk/>
+      </pc:docMkLst>
+      <pc:sldChg chg="modSp">
+        <pc:chgData name="Stevens, David" userId="73fe415a-d21a-4898-bfab-0e75d37181d7" providerId="ADAL" clId="{403B20FF-6D52-4F6C-865B-305E558DE084}" dt="2018-11-22T11:52:46.018" v="187" actId="20577"/>
+        <pc:sldMkLst>
+          <pc:docMk/>
+          <pc:sldMk cId="340440126" sldId="257"/>
+        </pc:sldMkLst>
+        <pc:spChg chg="mod">
+          <ac:chgData name="Stevens, David" userId="73fe415a-d21a-4898-bfab-0e75d37181d7" providerId="ADAL" clId="{403B20FF-6D52-4F6C-865B-305E558DE084}" dt="2018-11-22T11:52:46.018" v="187" actId="20577"/>
+          <ac:spMkLst>
+            <pc:docMk/>
+            <pc:sldMk cId="340440126" sldId="257"/>
+            <ac:spMk id="16" creationId="{F949EEEA-FDF2-4FFE-9129-B5FBDF3B6118}"/>
+          </ac:spMkLst>
+        </pc:spChg>
+      </pc:sldChg>
+    </pc:docChg>
+  </pc:docChgLst>
   <pc:docChgLst>
     <pc:chgData name="David Stevens" userId="73fe415a-d21a-4898-bfab-0e75d37181d7" providerId="ADAL" clId="{8A5D56DB-8F01-4111-8444-CF026C533998}"/>
     <pc:docChg chg="modSld">
@@ -328,7 +344,7 @@
                 <a:latin typeface="Arial"/>
                 <a:cs typeface="Arial"/>
               </a:rPr>
-              <a:t>10/18/2018</a:t>
+              <a:t>11/22/2018</a:t>
             </a:fld>
             <a:endParaRPr lang="en-US">
               <a:latin typeface="Arial"/>
@@ -513,7 +529,7 @@
             <a:fld id="{73B26A0F-F4D6-9B4F-A87B-D8948CDE3BB4}" type="datetimeFigureOut">
               <a:rPr lang="en-US" smtClean="0"/>
               <a:pPr/>
-              <a:t>10/18/2018</a:t>
+              <a:t>11/22/2018</a:t>
             </a:fld>
             <a:endParaRPr lang="en-US"/>
           </a:p>
@@ -4061,7 +4077,7 @@
                   <a:spcPct val="50000"/>
                 </a:spcBef>
               </a:pPr>
-              <a:t>October 18, 2018</a:t>
+              <a:t>November 22, 2018</a:t>
             </a:fld>
             <a:endParaRPr lang="en-US" sz="1100" b="0" dirty="0">
               <a:solidFill>
@@ -5814,7 +5830,7 @@
                   <a:spcPct val="50000"/>
                 </a:spcBef>
               </a:pPr>
-              <a:t>October 18, 2018</a:t>
+              <a:t>November 22, 2018</a:t>
             </a:fld>
             <a:endParaRPr lang="en-US" sz="1100" b="0" dirty="0">
               <a:solidFill>
@@ -7285,7 +7301,7 @@
                   <a:spcPct val="50000"/>
                 </a:spcBef>
               </a:pPr>
-              <a:t>October 18, 2018</a:t>
+              <a:t>November 22, 2018</a:t>
             </a:fld>
             <a:endParaRPr lang="en-US" sz="1100" b="0" dirty="0">
               <a:solidFill>
@@ -8638,7 +8654,7 @@
                   <a:spcPts val="0"/>
                 </a:spcBef>
               </a:pPr>
-              <a:t>October 18, 2018</a:t>
+              <a:t>November 22, 2018</a:t>
             </a:fld>
             <a:endParaRPr lang="en-US" sz="1100" b="0" dirty="0">
               <a:solidFill>
@@ -10075,7 +10091,7 @@
                   <a:spcPct val="50000"/>
                 </a:spcBef>
               </a:pPr>
-              <a:t>October 18, 2018</a:t>
+              <a:t>November 22, 2018</a:t>
             </a:fld>
             <a:endParaRPr lang="en-US" sz="1100" b="0" dirty="0">
               <a:solidFill>
@@ -13331,7 +13347,7 @@
                   <a:spcPts val="0"/>
                 </a:spcBef>
               </a:pPr>
-              <a:t>October 18, 2018</a:t>
+              <a:t>November 22, 2018</a:t>
             </a:fld>
             <a:endParaRPr lang="en-US" sz="1400" b="0" dirty="0">
               <a:solidFill>
@@ -14722,7 +14738,7 @@
                   <a:spcPts val="0"/>
                 </a:spcBef>
               </a:pPr>
-              <a:t>October 18, 2018</a:t>
+              <a:t>November 22, 2018</a:t>
             </a:fld>
             <a:endParaRPr lang="en-US" sz="1400" b="0" dirty="0">
               <a:solidFill>
@@ -16283,7 +16299,7 @@
                   <a:spcPts val="0"/>
                 </a:spcBef>
               </a:pPr>
-              <a:t>October 18, 2018</a:t>
+              <a:t>November 22, 2018</a:t>
             </a:fld>
             <a:endParaRPr lang="en-US" sz="1400" b="0" dirty="0">
               <a:solidFill>
@@ -17705,7 +17721,7 @@
                   <a:spcPts val="0"/>
                 </a:spcBef>
               </a:pPr>
-              <a:t>October 18, 2018</a:t>
+              <a:t>November 22, 2018</a:t>
             </a:fld>
             <a:endParaRPr lang="en-US" sz="1400" b="0" dirty="0">
               <a:solidFill>
@@ -19119,7 +19135,7 @@
                   <a:spcPts val="0"/>
                 </a:spcBef>
               </a:pPr>
-              <a:t>October 18, 2018</a:t>
+              <a:t>November 22, 2018</a:t>
             </a:fld>
             <a:endParaRPr lang="en-US" sz="1400" b="0" dirty="0">
               <a:solidFill>
@@ -21071,7 +21087,7 @@
         <p:spPr>
           <a:xfrm>
             <a:off x="685800" y="5280380"/>
-            <a:ext cx="8861648" cy="914400"/>
+            <a:ext cx="10661848" cy="914400"/>
           </a:xfrm>
         </p:spPr>
         <p:txBody>
@@ -21079,12 +21095,12 @@
           <a:lstStyle/>
           <a:p>
             <a:r>
-              <a:rPr lang="en-US" dirty="0"/>
-              <a:t>#9 </a:t>
+              <a:rPr lang="en-US" sz="2400" dirty="0"/>
+              <a:t>#13 </a:t>
             </a:r>
             <a:r>
-              <a:rPr lang="en-GB" dirty="0"/>
-              <a:t>Roadmap Insights</a:t>
+              <a:rPr lang="en-GB" sz="2400" dirty="0"/>
+              <a:t>Account Business Value Framework</a:t>
             </a:r>
           </a:p>
         </p:txBody>

</xml_diff>